<commit_message>
update design pattern slide
</commit_message>
<xml_diff>
--- a/Slide/Factory Method.pptx
+++ b/Slide/Factory Method.pptx
@@ -290,7 +290,7 @@
       </p15:notesGuideLst>
     </p:ext>
     <p:ext uri="GoogleSlidesCustomDataVersion2">
-      <go:slidesCustomData xmlns="" xmlns:mc="http://schemas.openxmlformats.org/markup-compatibility/2006" xmlns:mv="urn:schemas-microsoft-com:mac:vml" xmlns:c="http://schemas.openxmlformats.org/drawingml/2006/chart" xmlns:dgm="http://schemas.openxmlformats.org/drawingml/2006/diagram" xmlns:o="urn:schemas-microsoft-com:office:office" xmlns:v="urn:schemas-microsoft-com:vml" xmlns:pvml="urn:schemas-microsoft-com:office:powerpoint" xmlns:com="http://schemas.openxmlformats.org/drawingml/2006/compatibility" xmlns:p14="http://schemas.microsoft.com/office/powerpoint/2010/main" xmlns:p15="http://schemas.microsoft.com/office/powerpoint/2012/main" xmlns:ahyp="http://schemas.microsoft.com/office/drawing/2018/hyperlinkcolor" xmlns:go="http://customooxmlschemas.google.com/" r:id="rId27" roundtripDataSignature="AMtx7mhFL0S+EB+YENk/eIaUoqsgbu5ROg=="/>
+      <go:slidesCustomData xmlns:go="http://customooxmlschemas.google.com/" xmlns:ahyp="http://schemas.microsoft.com/office/drawing/2018/hyperlinkcolor" xmlns:p15="http://schemas.microsoft.com/office/powerpoint/2012/main" xmlns:p14="http://schemas.microsoft.com/office/powerpoint/2010/main" xmlns:com="http://schemas.openxmlformats.org/drawingml/2006/compatibility" xmlns:pvml="urn:schemas-microsoft-com:office:powerpoint" xmlns:v="urn:schemas-microsoft-com:vml" xmlns:o="urn:schemas-microsoft-com:office:office" xmlns:dgm="http://schemas.openxmlformats.org/drawingml/2006/diagram" xmlns:c="http://schemas.openxmlformats.org/drawingml/2006/chart" xmlns:mv="urn:schemas-microsoft-com:mac:vml" xmlns:mc="http://schemas.openxmlformats.org/markup-compatibility/2006" xmlns="" r:id="rId27" roundtripDataSignature="AMtx7mhFL0S+EB+YENk/eIaUoqsgbu5ROg=="/>
     </p:ext>
   </p:extLst>
 </p:presentation>
@@ -13209,7 +13209,18 @@
                   <a:schemeClr val="lt1"/>
                 </a:highlight>
               </a:rPr>
-              <a:t> con (subclass)</a:t>
+              <a:t> con (</a:t>
+            </a:r>
+            <a:r>
+              <a:rPr lang="en-US" sz="2400">
+                <a:solidFill>
+                  <a:srgbClr val="1B1B1B"/>
+                </a:solidFill>
+                <a:highlight>
+                  <a:schemeClr val="lt1"/>
+                </a:highlight>
+              </a:rPr>
+              <a:t>subclass).</a:t>
             </a:r>
             <a:endParaRPr sz="2400" dirty="0">
               <a:solidFill>

</xml_diff>